<commit_message>
Removed vk link from LINQ presentation
</commit_message>
<xml_diff>
--- a/Presentation/lesson-11.pptx
+++ b/Presentation/lesson-11.pptx
@@ -196,7 +196,7 @@
           <a:p>
             <a:fld id="{B24A7054-7FFB-49F4-A126-5DF6E687FF53}" type="datetimeFigureOut">
               <a:rPr lang="ru-RU" smtClean="0"/>
-              <a:t>06.11.2012</a:t>
+              <a:t>31.01.2013</a:t>
             </a:fld>
             <a:endParaRPr lang="ru-RU"/>
           </a:p>
@@ -1478,7 +1478,7 @@
           <a:p>
             <a:fld id="{8E6E6A2A-E9D3-4A0D-B04A-ABDD367A1E08}" type="datetimeFigureOut">
               <a:rPr lang="ru-RU" smtClean="0"/>
-              <a:t>06.11.2012</a:t>
+              <a:t>31.01.2013</a:t>
             </a:fld>
             <a:endParaRPr lang="ru-RU"/>
           </a:p>
@@ -2923,7 +2923,7 @@
           <a:p>
             <a:fld id="{AC3D3127-B7C4-45E3-9797-C527EC9FDD78}" type="datetimeFigureOut">
               <a:rPr lang="ru-RU" smtClean="0"/>
-              <a:t>06.11.2012</a:t>
+              <a:t>31.01.2013</a:t>
             </a:fld>
             <a:endParaRPr lang="ru-RU"/>
           </a:p>
@@ -3489,40 +3489,6 @@
           </a:p>
         </p:txBody>
       </p:sp>
-      <p:sp>
-        <p:nvSpPr>
-          <p:cNvPr id="8" name="TextBox 7"/>
-          <p:cNvSpPr txBox="1"/>
-          <p:nvPr/>
-        </p:nvSpPr>
-        <p:spPr>
-          <a:xfrm>
-            <a:off x="3120449" y="5589240"/>
-            <a:ext cx="2903102" cy="369332"/>
-          </a:xfrm>
-          <a:prstGeom prst="rect">
-            <a:avLst/>
-          </a:prstGeom>
-          <a:noFill/>
-        </p:spPr>
-        <p:txBody>
-          <a:bodyPr wrap="none" rtlCol="0">
-            <a:spAutoFit/>
-          </a:bodyPr>
-          <a:lstStyle/>
-          <a:p>
-            <a:r>
-              <a:rPr lang="en-US" dirty="0">
-                <a:solidFill>
-                  <a:schemeClr val="bg1"/>
-                </a:solidFill>
-              </a:rPr>
-              <a:t>http://vk.com/club33848893</a:t>
-            </a:r>
-            <a:endParaRPr lang="en-US" dirty="0"/>
-          </a:p>
-        </p:txBody>
-      </p:sp>
     </p:spTree>
     <p:extLst>
       <p:ext uri="{BB962C8B-B14F-4D97-AF65-F5344CB8AC3E}">
@@ -3599,9 +3565,10 @@
           <a:lstStyle/>
           <a:p>
             <a:r>
-              <a:rPr lang="en-US" dirty="0"/>
-              <a:t>?</a:t>
-            </a:r>
+              <a:rPr lang="en-US" smtClean="0"/>
+              <a:t>LINQ in C# 2010</a:t>
+            </a:r>
+            <a:endParaRPr lang="en-US" dirty="0"/>
           </a:p>
         </p:txBody>
       </p:sp>

</xml_diff>